<commit_message>
updated wireframe and fixed filters issue
</commit_message>
<xml_diff>
--- a/design/wireframe.pptx
+++ b/design/wireframe.pptx
@@ -11961,10 +11961,10 @@
       </p:pic>
       <p:pic>
         <p:nvPicPr>
-          <p:cNvPr id="3" name="Picture 2">
+          <p:cNvPr id="9" name="Picture 8">
             <a:extLst>
               <a:ext uri="{FF2B5EF4-FFF2-40B4-BE49-F238E27FC236}">
-                <a16:creationId xmlns:a16="http://schemas.microsoft.com/office/drawing/2014/main" id="{0F6C4D70-C9B9-444E-96F6-CB8E91A1AC17}"/>
+                <a16:creationId xmlns:a16="http://schemas.microsoft.com/office/drawing/2014/main" id="{57A9BF85-8418-45E9-B204-CD9318E66955}"/>
               </a:ext>
             </a:extLst>
           </p:cNvPr>
@@ -11981,8 +11981,8 @@
         </p:blipFill>
         <p:spPr>
           <a:xfrm>
-            <a:off x="1748460" y="1346829"/>
-            <a:ext cx="10189997" cy="1370852"/>
+            <a:off x="1777436" y="1346829"/>
+            <a:ext cx="10132045" cy="1034522"/>
           </a:xfrm>
           <a:prstGeom prst="rect">
             <a:avLst/>
@@ -12426,10 +12426,10 @@
       </p:sp>
       <p:pic>
         <p:nvPicPr>
-          <p:cNvPr id="6" name="Picture 5">
+          <p:cNvPr id="9" name="Picture 8">
             <a:extLst>
               <a:ext uri="{FF2B5EF4-FFF2-40B4-BE49-F238E27FC236}">
-                <a16:creationId xmlns:a16="http://schemas.microsoft.com/office/drawing/2014/main" id="{009CC426-4C72-4CF7-A0F0-451AA5558E59}"/>
+                <a16:creationId xmlns:a16="http://schemas.microsoft.com/office/drawing/2014/main" id="{D3EC76EA-0263-4AA3-8874-7E49A437B6DA}"/>
               </a:ext>
             </a:extLst>
           </p:cNvPr>
@@ -12446,8 +12446,8 @@
         </p:blipFill>
         <p:spPr>
           <a:xfrm>
-            <a:off x="1809750" y="2180437"/>
-            <a:ext cx="10130612" cy="1362863"/>
+            <a:off x="1777436" y="2201921"/>
+            <a:ext cx="10132045" cy="1034522"/>
           </a:xfrm>
           <a:prstGeom prst="rect">
             <a:avLst/>
@@ -12891,10 +12891,10 @@
       </p:pic>
       <p:pic>
         <p:nvPicPr>
-          <p:cNvPr id="6" name="Picture 5">
+          <p:cNvPr id="5" name="Picture 4">
             <a:extLst>
               <a:ext uri="{FF2B5EF4-FFF2-40B4-BE49-F238E27FC236}">
-                <a16:creationId xmlns:a16="http://schemas.microsoft.com/office/drawing/2014/main" id="{ADC3F9E3-6F7E-471E-A067-9C126785945C}"/>
+                <a16:creationId xmlns:a16="http://schemas.microsoft.com/office/drawing/2014/main" id="{0F693E60-E552-4315-8060-C5DB67201322}"/>
               </a:ext>
             </a:extLst>
           </p:cNvPr>
@@ -12911,8 +12911,8 @@
         </p:blipFill>
         <p:spPr>
           <a:xfrm>
-            <a:off x="1733549" y="2174171"/>
-            <a:ext cx="10189997" cy="1370852"/>
+            <a:off x="1777436" y="2230944"/>
+            <a:ext cx="10132045" cy="1034522"/>
           </a:xfrm>
           <a:prstGeom prst="rect">
             <a:avLst/>
@@ -13272,10 +13272,10 @@
       </p:pic>
       <p:pic>
         <p:nvPicPr>
-          <p:cNvPr id="16" name="Picture 15">
+          <p:cNvPr id="5" name="Picture 4">
             <a:extLst>
               <a:ext uri="{FF2B5EF4-FFF2-40B4-BE49-F238E27FC236}">
-                <a16:creationId xmlns:a16="http://schemas.microsoft.com/office/drawing/2014/main" id="{C4C115C2-8446-4A27-B7C2-29D8E4DF1FA8}"/>
+                <a16:creationId xmlns:a16="http://schemas.microsoft.com/office/drawing/2014/main" id="{1EC6ED00-04A2-4715-A1E8-DF3E01E3B926}"/>
               </a:ext>
             </a:extLst>
           </p:cNvPr>
@@ -13292,8 +13292,8 @@
         </p:blipFill>
         <p:spPr>
           <a:xfrm>
-            <a:off x="1761230" y="2109788"/>
-            <a:ext cx="10189997" cy="1370852"/>
+            <a:off x="1777436" y="2109788"/>
+            <a:ext cx="10132045" cy="1034522"/>
           </a:xfrm>
           <a:prstGeom prst="rect">
             <a:avLst/>
@@ -16129,7 +16129,7 @@
           <a:graphicData uri="http://schemas.openxmlformats.org/presentationml/2006/ole">
             <mc:AlternateContent xmlns:mc="http://schemas.openxmlformats.org/markup-compatibility/2006">
               <mc:Choice xmlns:v="urn:schemas-microsoft-com:vml" Requires="v">
-                <p:oleObj spid="_x0000_s1052" name="Image" r:id="rId7" imgW="13599720" imgH="888840" progId="Photoshop.Image.13">
+                <p:oleObj spid="_x0000_s1053" name="Image" r:id="rId7" imgW="13599720" imgH="888840" progId="Photoshop.Image.13">
                   <p:embed/>
                 </p:oleObj>
               </mc:Choice>

</xml_diff>